<commit_message>
project data files updated. class lectures updated.
</commit_message>
<xml_diff>
--- a/lectures/lec2/Halstead_Complexity.pptx
+++ b/lectures/lec2/Halstead_Complexity.pptx
@@ -190,7 +190,7 @@
           <a:bodyPr anchor="b" bIns="0" lIns="0" rIns="0" tIns="0" wrap="none"/>
           <a:p>
             <a:pPr algn="r"/>
-            <a:fld id="{4F3C20E2-CE44-42AC-B1A7-F066F2F0B0B0}" type="slidenum">
+            <a:fld id="{E1EE386E-7EF8-44DF-BE6A-01C106912ABB}" type="slidenum">
               <a:rPr lang="en-CA"/>
               <a:t>&lt;number&gt;</a:t>
             </a:fld>
@@ -234,7 +234,7 @@
         <p:spPr>
           <a:xfrm>
             <a:off x="685800" y="4343400"/>
-            <a:ext cx="5485680" cy="4114080"/>
+            <a:ext cx="5485320" cy="4113720"/>
           </a:xfrm>
           <a:prstGeom prst="rect">
             <a:avLst/>
@@ -260,7 +260,7 @@
         <p:spPr>
           <a:xfrm>
             <a:off x="3884760" y="8685360"/>
-            <a:ext cx="2971080" cy="456480"/>
+            <a:ext cx="2970720" cy="456120"/>
           </a:xfrm>
           <a:prstGeom prst="rect">
             <a:avLst/>
@@ -274,7 +274,7 @@
                 <a:spcPct val="100000"/>
               </a:lnSpc>
             </a:pPr>
-            <a:fld id="{F89472FA-A44D-4200-8233-46F0F39E6A5A}" type="slidenum">
+            <a:fld id="{2C7CD3E3-FFD4-4CCB-B3B3-CB844698E9FB}" type="slidenum">
               <a:rPr lang="en-CA" sz="1200">
                 <a:solidFill>
                   <a:srgbClr val="000000"/>
@@ -2545,8 +2545,8 @@
         </p:nvSpPr>
         <p:spPr>
           <a:xfrm>
-            <a:off x="457200" y="274680"/>
-            <a:ext cx="8228880" cy="1142640"/>
+            <a:off x="457200" y="273600"/>
+            <a:ext cx="8228880" cy="1144800"/>
           </a:xfrm>
           <a:prstGeom prst="rect">
             <a:avLst/>
@@ -2576,7 +2576,7 @@
         <p:spPr>
           <a:xfrm>
             <a:off x="457200" y="1604520"/>
-            <a:ext cx="8229240" cy="3976920"/>
+            <a:ext cx="8228880" cy="3976560"/>
           </a:xfrm>
           <a:prstGeom prst="rect">
             <a:avLst/>
@@ -2723,7 +2723,7 @@
         <p:spPr>
           <a:xfrm>
             <a:off x="0" y="6356520"/>
-            <a:ext cx="9143280" cy="364320"/>
+            <a:ext cx="9142920" cy="363960"/>
           </a:xfrm>
           <a:prstGeom prst="rect">
             <a:avLst/>
@@ -2951,7 +2951,7 @@
         <p:spPr>
           <a:xfrm>
             <a:off x="685800" y="2130480"/>
-            <a:ext cx="7771680" cy="1469160"/>
+            <a:ext cx="7771320" cy="1468800"/>
           </a:xfrm>
           <a:prstGeom prst="rect">
             <a:avLst/>
@@ -2987,7 +2987,7 @@
         <p:spPr>
           <a:xfrm>
             <a:off x="1371600" y="3886200"/>
-            <a:ext cx="6400080" cy="1751760"/>
+            <a:ext cx="6399720" cy="1751400"/>
           </a:xfrm>
           <a:prstGeom prst="rect">
             <a:avLst/>
@@ -3023,7 +3023,7 @@
         <p:spPr>
           <a:xfrm>
             <a:off x="0" y="6356520"/>
-            <a:ext cx="9143280" cy="364320"/>
+            <a:ext cx="9142920" cy="363960"/>
           </a:xfrm>
           <a:prstGeom prst="rect">
             <a:avLst/>
@@ -3076,7 +3076,7 @@
         <p:spPr>
           <a:xfrm>
             <a:off x="6553080" y="6356520"/>
-            <a:ext cx="2133000" cy="364320"/>
+            <a:ext cx="2132640" cy="363960"/>
           </a:xfrm>
           <a:prstGeom prst="rect">
             <a:avLst/>
@@ -3090,7 +3090,7 @@
                 <a:spcPct val="100000"/>
               </a:lnSpc>
             </a:pPr>
-            <a:fld id="{61E5A87E-5383-4590-B49F-A2C57A47BA5D}" type="slidenum">
+            <a:fld id="{AFC40D13-6531-4A5C-9025-7FD1AD229306}" type="slidenum">
               <a:rPr lang="en-CA" sz="1200">
                 <a:solidFill>
                   <a:srgbClr val="8b8b8b"/>
@@ -3134,7 +3134,7 @@
         <p:spPr>
           <a:xfrm>
             <a:off x="457200" y="0"/>
-            <a:ext cx="8228880" cy="1142280"/>
+            <a:ext cx="8228520" cy="1141920"/>
           </a:xfrm>
           <a:prstGeom prst="rect">
             <a:avLst/>
@@ -3179,7 +3179,7 @@
         <p:spPr>
           <a:xfrm>
             <a:off x="6553080" y="6356520"/>
-            <a:ext cx="2133000" cy="364320"/>
+            <a:ext cx="2132640" cy="363960"/>
           </a:xfrm>
           <a:prstGeom prst="rect">
             <a:avLst/>
@@ -3193,7 +3193,7 @@
                 <a:spcPct val="100000"/>
               </a:lnSpc>
             </a:pPr>
-            <a:fld id="{2BA62548-871E-4AD9-ABAC-85339404F17A}" type="slidenum">
+            <a:fld id="{E0988F26-FC5B-4F85-8C90-DE58D9FFA0C8}" type="slidenum">
               <a:rPr lang="en-CA" sz="1200">
                 <a:solidFill>
                   <a:srgbClr val="8b8b8b"/>
@@ -3215,7 +3215,7 @@
         <p:spPr>
           <a:xfrm>
             <a:off x="1509120" y="1295280"/>
-            <a:ext cx="6125040" cy="5257080"/>
+            <a:ext cx="6124680" cy="5256720"/>
           </a:xfrm>
           <a:prstGeom prst="rect">
             <a:avLst/>
@@ -3702,7 +3702,7 @@
         <p:spPr>
           <a:xfrm>
             <a:off x="6553080" y="6356520"/>
-            <a:ext cx="2133000" cy="364320"/>
+            <a:ext cx="2132640" cy="363960"/>
           </a:xfrm>
           <a:prstGeom prst="rect">
             <a:avLst/>
@@ -3716,7 +3716,7 @@
                 <a:spcPct val="100000"/>
               </a:lnSpc>
             </a:pPr>
-            <a:fld id="{3BB22165-09A5-4304-951E-235CA84AAD5D}" type="slidenum">
+            <a:fld id="{FA5B3BB0-E11A-4B7E-B6F1-FAFFCA31D3C0}" type="slidenum">
               <a:rPr lang="en-CA" sz="1200">
                 <a:solidFill>
                   <a:srgbClr val="8b8b8b"/>
@@ -3737,7 +3737,7 @@
         </p:nvGraphicFramePr>
         <p:xfrm>
           <a:off x="380880" y="76320"/>
-          <a:ext cx="3123360" cy="6674400"/>
+          <a:ext cx="3123000" cy="6674040"/>
         </p:xfrm>
         <a:graphic>
           <a:graphicData uri="http://schemas.openxmlformats.org/drawingml/2006/table">
@@ -3745,7 +3745,7 @@
               <a:tblPr/>
               <a:tblGrid>
                 <a:gridCol w="1447560"/>
-                <a:gridCol w="1675800"/>
+                <a:gridCol w="1675440"/>
               </a:tblGrid>
               <a:tr h="622440">
                 <a:tc>
@@ -4624,7 +4624,7 @@
         <p:spPr>
           <a:xfrm>
             <a:off x="3581280" y="5726520"/>
-            <a:ext cx="837360" cy="637920"/>
+            <a:ext cx="837000" cy="637560"/>
           </a:xfrm>
           <a:prstGeom prst="rect">
             <a:avLst/>
@@ -4669,7 +4669,7 @@
         <p:spPr>
           <a:xfrm>
             <a:off x="5105520" y="5726520"/>
-            <a:ext cx="913680" cy="637920"/>
+            <a:ext cx="913320" cy="637560"/>
           </a:xfrm>
           <a:prstGeom prst="rect">
             <a:avLst/>
@@ -4713,7 +4713,7 @@
         </p:nvGraphicFramePr>
         <p:xfrm>
           <a:off x="5257800" y="304920"/>
-          <a:ext cx="3123360" cy="3606120"/>
+          <a:ext cx="3123000" cy="3605760"/>
         </p:xfrm>
         <a:graphic>
           <a:graphicData uri="http://schemas.openxmlformats.org/drawingml/2006/table">
@@ -4721,7 +4721,7 @@
               <a:tblPr/>
               <a:tblGrid>
                 <a:gridCol w="1447560"/>
-                <a:gridCol w="1675800"/>
+                <a:gridCol w="1675440"/>
               </a:tblGrid>
               <a:tr h="887760">
                 <a:tc>
@@ -5195,7 +5195,7 @@
         <p:spPr>
           <a:xfrm>
             <a:off x="5638680" y="3962520"/>
-            <a:ext cx="837360" cy="637920"/>
+            <a:ext cx="837000" cy="637560"/>
           </a:xfrm>
           <a:prstGeom prst="rect">
             <a:avLst/>
@@ -5240,7 +5240,7 @@
         <p:spPr>
           <a:xfrm>
             <a:off x="7162920" y="3962520"/>
-            <a:ext cx="913680" cy="637920"/>
+            <a:ext cx="913320" cy="637560"/>
           </a:xfrm>
           <a:prstGeom prst="rect">
             <a:avLst/>
@@ -5285,7 +5285,7 @@
         <p:spPr>
           <a:xfrm>
             <a:off x="4157280" y="4687560"/>
-            <a:ext cx="4043880" cy="638640"/>
+            <a:ext cx="4043520" cy="638280"/>
           </a:xfrm>
           <a:prstGeom prst="rect">
             <a:avLst/>
@@ -5356,7 +5356,7 @@
         <p:spPr>
           <a:xfrm>
             <a:off x="3657600" y="4687560"/>
-            <a:ext cx="5043600" cy="645480"/>
+            <a:ext cx="5043240" cy="645120"/>
           </a:xfrm>
           <a:prstGeom prst="rect">
             <a:avLst/>
@@ -5420,7 +5420,7 @@
         <p:spPr>
           <a:xfrm>
             <a:off x="457200" y="274680"/>
-            <a:ext cx="8228880" cy="1142280"/>
+            <a:ext cx="8228520" cy="1141920"/>
           </a:xfrm>
           <a:prstGeom prst="rect">
             <a:avLst/>
@@ -5456,7 +5456,7 @@
         <p:spPr>
           <a:xfrm>
             <a:off x="457200" y="1600200"/>
-            <a:ext cx="8228880" cy="4525200"/>
+            <a:ext cx="8228520" cy="4524840"/>
           </a:xfrm>
           <a:prstGeom prst="rect">
             <a:avLst/>
@@ -5593,7 +5593,7 @@
         <p:spPr>
           <a:xfrm>
             <a:off x="457200" y="1600200"/>
-            <a:ext cx="8228880" cy="4525200"/>
+            <a:ext cx="8228520" cy="4524840"/>
           </a:xfrm>
           <a:prstGeom prst="rect">
             <a:avLst/>
@@ -5631,7 +5631,7 @@
         <p:spPr>
           <a:xfrm>
             <a:off x="6553080" y="6356520"/>
-            <a:ext cx="2133000" cy="364320"/>
+            <a:ext cx="2132640" cy="363960"/>
           </a:xfrm>
           <a:prstGeom prst="rect">
             <a:avLst/>
@@ -5645,7 +5645,7 @@
                 <a:spcPct val="100000"/>
               </a:lnSpc>
             </a:pPr>
-            <a:fld id="{438A0587-6F03-4018-AE1E-B903135A2ACD}" type="slidenum">
+            <a:fld id="{B07869E6-DE25-4E3F-9C00-415D50643ACB}" type="slidenum">
               <a:rPr lang="en-CA" sz="1200">
                 <a:solidFill>
                   <a:srgbClr val="8b8b8b"/>
@@ -5689,7 +5689,7 @@
         <p:spPr>
           <a:xfrm>
             <a:off x="457200" y="274680"/>
-            <a:ext cx="8228880" cy="1142280"/>
+            <a:ext cx="8228520" cy="1141920"/>
           </a:xfrm>
           <a:prstGeom prst="rect">
             <a:avLst/>
@@ -5725,7 +5725,7 @@
         <p:spPr>
           <a:xfrm>
             <a:off x="304920" y="1600200"/>
-            <a:ext cx="8533800" cy="4525200"/>
+            <a:ext cx="8533440" cy="4524840"/>
           </a:xfrm>
           <a:prstGeom prst="rect">
             <a:avLst/>
@@ -5742,7 +5742,7 @@
               <a:buChar char="•"/>
             </a:pPr>
             <a:r>
-              <a:rPr lang="en-CA" sz="3200">
+              <a:rPr lang="en-CA" sz="2200">
                 <a:solidFill>
                   <a:srgbClr val="000000"/>
                 </a:solidFill>
@@ -5751,7 +5751,7 @@
               <a:t>The program should be completed or near completed to determine </a:t>
             </a:r>
             <a:r>
-              <a:rPr b="1" i="1" lang="en-CA" sz="3200">
+              <a:rPr b="1" i="1" lang="en-CA" sz="2200">
                 <a:solidFill>
                   <a:srgbClr val="000000"/>
                 </a:solidFill>
@@ -5760,7 +5760,7 @@
               <a:t>N1</a:t>
             </a:r>
             <a:r>
-              <a:rPr lang="en-CA" sz="3200">
+              <a:rPr lang="en-CA" sz="2200">
                 <a:solidFill>
                   <a:srgbClr val="000000"/>
                 </a:solidFill>
@@ -5769,7 +5769,7 @@
               <a:t> and </a:t>
             </a:r>
             <a:r>
-              <a:rPr b="1" i="1" lang="en-CA" sz="3200">
+              <a:rPr b="1" i="1" lang="en-CA" sz="2200">
                 <a:solidFill>
                   <a:srgbClr val="000000"/>
                 </a:solidFill>
@@ -5788,7 +5788,7 @@
               <a:buChar char="•"/>
             </a:pPr>
             <a:r>
-              <a:rPr lang="en-CA" sz="3200">
+              <a:rPr lang="en-CA" sz="2200">
                 <a:solidFill>
                   <a:srgbClr val="000000"/>
                 </a:solidFill>
@@ -5807,7 +5807,7 @@
               <a:buChar char="•"/>
             </a:pPr>
             <a:r>
-              <a:rPr lang="en-CA" sz="3200">
+              <a:rPr lang="en-CA" sz="2200">
                 <a:solidFill>
                   <a:srgbClr val="000000"/>
                 </a:solidFill>
@@ -5826,7 +5826,7 @@
               <a:buChar char="•"/>
             </a:pPr>
             <a:r>
-              <a:rPr lang="en-CA" sz="3200">
+              <a:rPr lang="en-CA" sz="2200">
                 <a:solidFill>
                   <a:srgbClr val="000000"/>
                 </a:solidFill>
@@ -5847,7 +5847,7 @@
         <p:spPr>
           <a:xfrm>
             <a:off x="6553080" y="6356520"/>
-            <a:ext cx="2133000" cy="364320"/>
+            <a:ext cx="2132640" cy="363960"/>
           </a:xfrm>
           <a:prstGeom prst="rect">
             <a:avLst/>
@@ -5861,7 +5861,7 @@
                 <a:spcPct val="100000"/>
               </a:lnSpc>
             </a:pPr>
-            <a:fld id="{F3F75CF3-8A5D-4494-A138-6DFA2DC3077D}" type="slidenum">
+            <a:fld id="{5ACD8688-4A91-486A-9E57-79E8D75C8434}" type="slidenum">
               <a:rPr lang="en-CA" sz="1200">
                 <a:solidFill>
                   <a:srgbClr val="8b8b8b"/>
@@ -5876,6 +5876,33 @@
       </p:sp>
     </p:spTree>
   </p:cSld>
+  <p:timing>
+    <p:tnLst>
+      <p:par>
+        <p:cTn dur="indefinite" id="95" nodeType="tmRoot" restart="never">
+          <p:childTnLst>
+            <p:seq>
+              <p:cTn id="96" nodeType="mainSeq"/>
+              <p:prevCondLst>
+                <p:cond delay="0" evt="onPrev">
+                  <p:tgtEl>
+                    <p:sldTgt/>
+                  </p:tgtEl>
+                </p:cond>
+              </p:prevCondLst>
+              <p:nextCondLst>
+                <p:cond delay="0" evt="onNext">
+                  <p:tgtEl>
+                    <p:sldTgt/>
+                  </p:tgtEl>
+                </p:cond>
+              </p:nextCondLst>
+            </p:seq>
+          </p:childTnLst>
+        </p:cTn>
+      </p:par>
+    </p:tnLst>
+  </p:timing>
 </p:sld>
 </file>
 
@@ -5905,7 +5932,7 @@
         <p:spPr>
           <a:xfrm>
             <a:off x="457200" y="274680"/>
-            <a:ext cx="8228880" cy="1142280"/>
+            <a:ext cx="8228520" cy="1141920"/>
           </a:xfrm>
           <a:prstGeom prst="rect">
             <a:avLst/>
@@ -5941,7 +5968,7 @@
         <p:spPr>
           <a:xfrm>
             <a:off x="380880" y="1600200"/>
-            <a:ext cx="8381160" cy="4525200"/>
+            <a:ext cx="8380800" cy="4524840"/>
           </a:xfrm>
           <a:prstGeom prst="rect">
             <a:avLst/>
@@ -6016,7 +6043,7 @@
         <p:spPr>
           <a:xfrm>
             <a:off x="6553080" y="6356520"/>
-            <a:ext cx="2133000" cy="364320"/>
+            <a:ext cx="2132640" cy="363960"/>
           </a:xfrm>
           <a:prstGeom prst="rect">
             <a:avLst/>
@@ -6030,7 +6057,7 @@
                 <a:spcPct val="100000"/>
               </a:lnSpc>
             </a:pPr>
-            <a:fld id="{DBA62C12-BAB2-44B6-B144-C29CA73FDA4D}" type="slidenum">
+            <a:fld id="{D1DF0738-3106-4866-B0E7-60097A54380E}" type="slidenum">
               <a:rPr lang="en-CA" sz="1200">
                 <a:solidFill>
                   <a:srgbClr val="8b8b8b"/>
@@ -6074,7 +6101,7 @@
         <p:spPr>
           <a:xfrm>
             <a:off x="457200" y="274680"/>
-            <a:ext cx="8228880" cy="1142280"/>
+            <a:ext cx="8228520" cy="1141920"/>
           </a:xfrm>
           <a:prstGeom prst="rect">
             <a:avLst/>
@@ -6110,7 +6137,7 @@
         <p:spPr>
           <a:xfrm>
             <a:off x="380880" y="1600200"/>
-            <a:ext cx="8381160" cy="4525200"/>
+            <a:ext cx="8380800" cy="4524840"/>
           </a:xfrm>
           <a:prstGeom prst="rect">
             <a:avLst/>
@@ -6221,7 +6248,7 @@
         <p:spPr>
           <a:xfrm>
             <a:off x="6553080" y="6356520"/>
-            <a:ext cx="2133000" cy="364320"/>
+            <a:ext cx="2132640" cy="363960"/>
           </a:xfrm>
           <a:prstGeom prst="rect">
             <a:avLst/>
@@ -6235,7 +6262,7 @@
                 <a:spcPct val="100000"/>
               </a:lnSpc>
             </a:pPr>
-            <a:fld id="{56D29D38-475F-401A-A8C9-129883DF92F5}" type="slidenum">
+            <a:fld id="{D79D58F8-7218-4496-9264-D8C5E350C5B7}" type="slidenum">
               <a:rPr lang="en-CA" sz="1200">
                 <a:solidFill>
                   <a:srgbClr val="8b8b8b"/>
@@ -6306,7 +6333,7 @@
         <p:spPr>
           <a:xfrm>
             <a:off x="457200" y="274680"/>
-            <a:ext cx="8228880" cy="1142280"/>
+            <a:ext cx="8228520" cy="1141920"/>
           </a:xfrm>
           <a:prstGeom prst="rect">
             <a:avLst/>
@@ -6342,7 +6369,7 @@
         <p:spPr>
           <a:xfrm>
             <a:off x="457200" y="1600200"/>
-            <a:ext cx="8228880" cy="4525200"/>
+            <a:ext cx="8228520" cy="4524840"/>
           </a:xfrm>
           <a:prstGeom prst="rect">
             <a:avLst/>
@@ -6589,7 +6616,7 @@
         <p:spPr>
           <a:xfrm>
             <a:off x="457200" y="1600200"/>
-            <a:ext cx="8228880" cy="4525200"/>
+            <a:ext cx="8228520" cy="4524840"/>
           </a:xfrm>
           <a:prstGeom prst="rect">
             <a:avLst/>
@@ -6627,7 +6654,7 @@
         <p:spPr>
           <a:xfrm>
             <a:off x="6553080" y="6356520"/>
-            <a:ext cx="2133000" cy="364320"/>
+            <a:ext cx="2132640" cy="363960"/>
           </a:xfrm>
           <a:prstGeom prst="rect">
             <a:avLst/>
@@ -6641,7 +6668,7 @@
                 <a:spcPct val="100000"/>
               </a:lnSpc>
             </a:pPr>
-            <a:fld id="{3D5D2B75-44B4-4CE7-B6A8-2DE1240963F4}" type="slidenum">
+            <a:fld id="{7EE09CE7-A65C-4EA8-BC43-52B9631E2167}" type="slidenum">
               <a:rPr lang="en-CA" sz="1200">
                 <a:solidFill>
                   <a:srgbClr val="8b8b8b"/>
@@ -6685,7 +6712,7 @@
         <p:spPr>
           <a:xfrm>
             <a:off x="457200" y="274680"/>
-            <a:ext cx="8228880" cy="1142280"/>
+            <a:ext cx="8228520" cy="1141920"/>
           </a:xfrm>
           <a:prstGeom prst="rect">
             <a:avLst/>
@@ -6721,7 +6748,7 @@
         <p:spPr>
           <a:xfrm>
             <a:off x="1828800" y="1600200"/>
-            <a:ext cx="5485680" cy="4525200"/>
+            <a:ext cx="5485320" cy="4524840"/>
           </a:xfrm>
           <a:prstGeom prst="rect">
             <a:avLst/>
@@ -7151,7 +7178,7 @@
         <p:spPr>
           <a:xfrm>
             <a:off x="6553080" y="6356520"/>
-            <a:ext cx="2133000" cy="364320"/>
+            <a:ext cx="2132640" cy="363960"/>
           </a:xfrm>
           <a:prstGeom prst="rect">
             <a:avLst/>
@@ -7165,7 +7192,7 @@
                 <a:spcPct val="100000"/>
               </a:lnSpc>
             </a:pPr>
-            <a:fld id="{2E035DDC-074A-46CF-8DA9-C6EB392AC337}" type="slidenum">
+            <a:fld id="{65FEB8D3-F8F2-426A-96B2-30F9FD34334D}" type="slidenum">
               <a:rPr lang="en-CA" sz="1200">
                 <a:solidFill>
                   <a:srgbClr val="8b8b8b"/>
@@ -7217,7 +7244,6 @@
                                           </p:spTgt>
                                         </p:tgtEl>
                                       </p:cBhvr>
-                                      <p:to/>
                                     </p:set>
                                     <p:set>
                                       <p:cBhvr>
@@ -7230,7 +7256,6 @@
                                           </p:spTgt>
                                         </p:tgtEl>
                                       </p:cBhvr>
-                                      <p:to/>
                                     </p:set>
                                     <p:set>
                                       <p:cBhvr>
@@ -7264,7 +7289,6 @@
                                           </p:spTgt>
                                         </p:tgtEl>
                                       </p:cBhvr>
-                                      <p:to/>
                                     </p:set>
                                     <p:set>
                                       <p:cBhvr>
@@ -7277,7 +7301,6 @@
                                           </p:spTgt>
                                         </p:tgtEl>
                                       </p:cBhvr>
-                                      <p:to/>
                                     </p:set>
                                     <p:set>
                                       <p:cBhvr>
@@ -7311,7 +7334,6 @@
                                           </p:spTgt>
                                         </p:tgtEl>
                                       </p:cBhvr>
-                                      <p:to/>
                                     </p:set>
                                     <p:set>
                                       <p:cBhvr>
@@ -7324,7 +7346,6 @@
                                           </p:spTgt>
                                         </p:tgtEl>
                                       </p:cBhvr>
-                                      <p:to/>
                                     </p:set>
                                     <p:set>
                                       <p:cBhvr>
@@ -7358,7 +7379,6 @@
                                           </p:spTgt>
                                         </p:tgtEl>
                                       </p:cBhvr>
-                                      <p:to/>
                                     </p:set>
                                     <p:set>
                                       <p:cBhvr>
@@ -7371,7 +7391,6 @@
                                           </p:spTgt>
                                         </p:tgtEl>
                                       </p:cBhvr>
-                                      <p:to/>
                                     </p:set>
                                     <p:set>
                                       <p:cBhvr>
@@ -7405,7 +7424,6 @@
                                           </p:spTgt>
                                         </p:tgtEl>
                                       </p:cBhvr>
-                                      <p:to/>
                                     </p:set>
                                     <p:set>
                                       <p:cBhvr>
@@ -7418,7 +7436,6 @@
                                           </p:spTgt>
                                         </p:tgtEl>
                                       </p:cBhvr>
-                                      <p:to/>
                                     </p:set>
                                     <p:set>
                                       <p:cBhvr>
@@ -7452,7 +7469,6 @@
                                           </p:spTgt>
                                         </p:tgtEl>
                                       </p:cBhvr>
-                                      <p:to/>
                                     </p:set>
                                     <p:set>
                                       <p:cBhvr>
@@ -7465,7 +7481,6 @@
                                           </p:spTgt>
                                         </p:tgtEl>
                                       </p:cBhvr>
-                                      <p:to/>
                                     </p:set>
                                     <p:set>
                                       <p:cBhvr>
@@ -7499,7 +7514,6 @@
                                           </p:spTgt>
                                         </p:tgtEl>
                                       </p:cBhvr>
-                                      <p:to/>
                                     </p:set>
                                     <p:set>
                                       <p:cBhvr>
@@ -7512,7 +7526,6 @@
                                           </p:spTgt>
                                         </p:tgtEl>
                                       </p:cBhvr>
-                                      <p:to/>
                                     </p:set>
                                     <p:set>
                                       <p:cBhvr>
@@ -7546,7 +7559,6 @@
                                           </p:spTgt>
                                         </p:tgtEl>
                                       </p:cBhvr>
-                                      <p:to/>
                                     </p:set>
                                     <p:set>
                                       <p:cBhvr>
@@ -7559,7 +7571,6 @@
                                           </p:spTgt>
                                         </p:tgtEl>
                                       </p:cBhvr>
-                                      <p:to/>
                                     </p:set>
                                     <p:set>
                                       <p:cBhvr>
@@ -7593,7 +7604,6 @@
                                           </p:spTgt>
                                         </p:tgtEl>
                                       </p:cBhvr>
-                                      <p:to/>
                                     </p:set>
                                     <p:set>
                                       <p:cBhvr>
@@ -7606,7 +7616,6 @@
                                           </p:spTgt>
                                         </p:tgtEl>
                                       </p:cBhvr>
-                                      <p:to/>
                                     </p:set>
                                     <p:set>
                                       <p:cBhvr>
@@ -7640,7 +7649,6 @@
                                           </p:spTgt>
                                         </p:tgtEl>
                                       </p:cBhvr>
-                                      <p:to/>
                                     </p:set>
                                     <p:set>
                                       <p:cBhvr>
@@ -7653,7 +7661,6 @@
                                           </p:spTgt>
                                         </p:tgtEl>
                                       </p:cBhvr>
-                                      <p:to/>
                                     </p:set>
                                     <p:set>
                                       <p:cBhvr>
@@ -7727,7 +7734,7 @@
         <p:spPr>
           <a:xfrm>
             <a:off x="6553080" y="6356520"/>
-            <a:ext cx="2133000" cy="364320"/>
+            <a:ext cx="2132640" cy="363960"/>
           </a:xfrm>
           <a:prstGeom prst="rect">
             <a:avLst/>
@@ -7741,7 +7748,7 @@
                 <a:spcPct val="100000"/>
               </a:lnSpc>
             </a:pPr>
-            <a:fld id="{C995D83C-CEE2-409A-93D7-761E5FCD6776}" type="slidenum">
+            <a:fld id="{C9E61E29-1A6F-4FDC-8C84-857A96C70F0F}" type="slidenum">
               <a:rPr lang="en-CA" sz="1200">
                 <a:solidFill>
                   <a:srgbClr val="8b8b8b"/>
@@ -7762,7 +7769,7 @@
         </p:nvGraphicFramePr>
         <p:xfrm>
           <a:off x="380880" y="304920"/>
-          <a:ext cx="3123360" cy="5831280"/>
+          <a:ext cx="3123000" cy="5830920"/>
         </p:xfrm>
         <a:graphic>
           <a:graphicData uri="http://schemas.openxmlformats.org/drawingml/2006/table">
@@ -7770,7 +7777,7 @@
               <a:tblPr/>
               <a:tblGrid>
                 <a:gridCol w="1447560"/>
-                <a:gridCol w="1675800"/>
+                <a:gridCol w="1675440"/>
               </a:tblGrid>
               <a:tr h="887760">
                 <a:tc>
@@ -8505,7 +8512,7 @@
         <p:spPr>
           <a:xfrm>
             <a:off x="762120" y="6172200"/>
-            <a:ext cx="837360" cy="637920"/>
+            <a:ext cx="837000" cy="637560"/>
           </a:xfrm>
           <a:prstGeom prst="rect">
             <a:avLst/>
@@ -8550,7 +8557,7 @@
         <p:spPr>
           <a:xfrm>
             <a:off x="2286000" y="6172200"/>
-            <a:ext cx="913680" cy="637920"/>
+            <a:ext cx="913320" cy="637560"/>
           </a:xfrm>
           <a:prstGeom prst="rect">
             <a:avLst/>
@@ -8594,7 +8601,7 @@
         </p:nvGraphicFramePr>
         <p:xfrm>
           <a:off x="5257800" y="304920"/>
-          <a:ext cx="3123360" cy="3235320"/>
+          <a:ext cx="3123000" cy="3234960"/>
         </p:xfrm>
         <a:graphic>
           <a:graphicData uri="http://schemas.openxmlformats.org/drawingml/2006/table">
@@ -8602,7 +8609,7 @@
               <a:tblPr/>
               <a:tblGrid>
                 <a:gridCol w="1447560"/>
-                <a:gridCol w="1675800"/>
+                <a:gridCol w="1675440"/>
               </a:tblGrid>
               <a:tr h="887760">
                 <a:tc>
@@ -9019,7 +9026,7 @@
         <p:spPr>
           <a:xfrm>
             <a:off x="5638680" y="3593160"/>
-            <a:ext cx="837360" cy="637920"/>
+            <a:ext cx="837000" cy="637560"/>
           </a:xfrm>
           <a:prstGeom prst="rect">
             <a:avLst/>
@@ -9064,7 +9071,7 @@
         <p:spPr>
           <a:xfrm>
             <a:off x="7162920" y="3593160"/>
-            <a:ext cx="913680" cy="637920"/>
+            <a:ext cx="913320" cy="637560"/>
           </a:xfrm>
           <a:prstGeom prst="rect">
             <a:avLst/>
@@ -9109,7 +9116,7 @@
         <p:spPr>
           <a:xfrm>
             <a:off x="4042440" y="4687560"/>
-            <a:ext cx="4565160" cy="638640"/>
+            <a:ext cx="4564800" cy="638280"/>
           </a:xfrm>
           <a:prstGeom prst="rect">
             <a:avLst/>
@@ -9180,7 +9187,7 @@
         <p:spPr>
           <a:xfrm>
             <a:off x="3657600" y="4687560"/>
-            <a:ext cx="5335200" cy="645480"/>
+            <a:ext cx="5334840" cy="645120"/>
           </a:xfrm>
           <a:prstGeom prst="rect">
             <a:avLst/>
@@ -9244,7 +9251,7 @@
         <p:spPr>
           <a:xfrm>
             <a:off x="457200" y="274680"/>
-            <a:ext cx="8228880" cy="1142280"/>
+            <a:ext cx="8228520" cy="1141920"/>
           </a:xfrm>
           <a:prstGeom prst="rect">
             <a:avLst/>
@@ -9280,7 +9287,7 @@
         <p:spPr>
           <a:xfrm>
             <a:off x="457200" y="1600200"/>
-            <a:ext cx="8228880" cy="4525200"/>
+            <a:ext cx="8228520" cy="4524840"/>
           </a:xfrm>
           <a:prstGeom prst="rect">
             <a:avLst/>
@@ -9453,7 +9460,7 @@
         <p:spPr>
           <a:xfrm>
             <a:off x="457200" y="1600200"/>
-            <a:ext cx="8228880" cy="4525200"/>
+            <a:ext cx="8228520" cy="4524840"/>
           </a:xfrm>
           <a:prstGeom prst="rect">
             <a:avLst/>
@@ -9491,7 +9498,7 @@
         <p:spPr>
           <a:xfrm>
             <a:off x="6553080" y="6356520"/>
-            <a:ext cx="2133000" cy="364320"/>
+            <a:ext cx="2132640" cy="363960"/>
           </a:xfrm>
           <a:prstGeom prst="rect">
             <a:avLst/>
@@ -9505,7 +9512,7 @@
                 <a:spcPct val="100000"/>
               </a:lnSpc>
             </a:pPr>
-            <a:fld id="{DBC9043D-AF90-450A-AC6D-B01721423AE8}" type="slidenum">
+            <a:fld id="{75B2FC1E-DE77-4D62-9EA3-C94854DFD310}" type="slidenum">
               <a:rPr lang="en-CA" sz="1200">
                 <a:solidFill>
                   <a:srgbClr val="8b8b8b"/>
@@ -9576,7 +9583,7 @@
         <p:spPr>
           <a:xfrm>
             <a:off x="457200" y="274680"/>
-            <a:ext cx="8228880" cy="1142280"/>
+            <a:ext cx="8228520" cy="1141920"/>
           </a:xfrm>
           <a:prstGeom prst="rect">
             <a:avLst/>
@@ -9612,7 +9619,7 @@
         <p:spPr>
           <a:xfrm>
             <a:off x="304920" y="1600200"/>
-            <a:ext cx="8533800" cy="4525200"/>
+            <a:ext cx="8533440" cy="4524840"/>
           </a:xfrm>
           <a:prstGeom prst="rect">
             <a:avLst/>
@@ -9757,7 +9764,7 @@
         <p:spPr>
           <a:xfrm>
             <a:off x="304920" y="1600200"/>
-            <a:ext cx="8533800" cy="4525200"/>
+            <a:ext cx="8533440" cy="4524840"/>
           </a:xfrm>
           <a:prstGeom prst="rect">
             <a:avLst/>
@@ -9795,7 +9802,7 @@
         <p:spPr>
           <a:xfrm>
             <a:off x="6553080" y="6356520"/>
-            <a:ext cx="2133000" cy="364320"/>
+            <a:ext cx="2132640" cy="363960"/>
           </a:xfrm>
           <a:prstGeom prst="rect">
             <a:avLst/>
@@ -9809,7 +9816,7 @@
                 <a:spcPct val="100000"/>
               </a:lnSpc>
             </a:pPr>
-            <a:fld id="{3B7160F3-BA92-4502-B975-850E25881A5C}" type="slidenum">
+            <a:fld id="{3ECAC804-010E-47B5-8A5C-48142BF490D5}" type="slidenum">
               <a:rPr lang="en-CA" sz="1200">
                 <a:solidFill>
                   <a:srgbClr val="8b8b8b"/>
@@ -9880,7 +9887,7 @@
         <p:spPr>
           <a:xfrm>
             <a:off x="457200" y="274680"/>
-            <a:ext cx="8228880" cy="1142280"/>
+            <a:ext cx="8228520" cy="1141920"/>
           </a:xfrm>
           <a:prstGeom prst="rect">
             <a:avLst/>
@@ -9916,7 +9923,7 @@
         <p:spPr>
           <a:xfrm>
             <a:off x="457200" y="1600200"/>
-            <a:ext cx="8228880" cy="4525200"/>
+            <a:ext cx="8228520" cy="4524840"/>
           </a:xfrm>
           <a:prstGeom prst="rect">
             <a:avLst/>
@@ -10053,7 +10060,7 @@
         <p:spPr>
           <a:xfrm>
             <a:off x="457200" y="1600200"/>
-            <a:ext cx="8228880" cy="4525200"/>
+            <a:ext cx="8228520" cy="4524840"/>
           </a:xfrm>
           <a:prstGeom prst="rect">
             <a:avLst/>
@@ -10091,7 +10098,7 @@
         <p:spPr>
           <a:xfrm>
             <a:off x="6553080" y="6356520"/>
-            <a:ext cx="2133000" cy="364320"/>
+            <a:ext cx="2132640" cy="363960"/>
           </a:xfrm>
           <a:prstGeom prst="rect">
             <a:avLst/>
@@ -10105,7 +10112,7 @@
                 <a:spcPct val="100000"/>
               </a:lnSpc>
             </a:pPr>
-            <a:fld id="{B15C810A-3A87-41B4-B55C-60D8E1019D24}" type="slidenum">
+            <a:fld id="{0C63B719-C734-4E47-A278-59E81A95796C}" type="slidenum">
               <a:rPr lang="en-CA" sz="1200">
                 <a:solidFill>
                   <a:srgbClr val="8b8b8b"/>
@@ -10149,7 +10156,7 @@
         <p:spPr>
           <a:xfrm>
             <a:off x="457200" y="274680"/>
-            <a:ext cx="8228880" cy="1142280"/>
+            <a:ext cx="8228520" cy="1141920"/>
           </a:xfrm>
           <a:prstGeom prst="rect">
             <a:avLst/>
@@ -10185,7 +10192,7 @@
         <p:spPr>
           <a:xfrm>
             <a:off x="4419720" y="1822320"/>
-            <a:ext cx="4619520" cy="4273200"/>
+            <a:ext cx="4619160" cy="4272840"/>
           </a:xfrm>
           <a:prstGeom prst="rect">
             <a:avLst/>
@@ -10650,7 +10657,7 @@
         <p:spPr>
           <a:xfrm>
             <a:off x="6553080" y="6356520"/>
-            <a:ext cx="2133000" cy="364320"/>
+            <a:ext cx="2132640" cy="363960"/>
           </a:xfrm>
           <a:prstGeom prst="rect">
             <a:avLst/>
@@ -10664,7 +10671,7 @@
                 <a:spcPct val="100000"/>
               </a:lnSpc>
             </a:pPr>
-            <a:fld id="{0BDCF898-AAA4-4F66-9352-C5968A7C2A51}" type="slidenum">
+            <a:fld id="{21954593-0472-4C79-B7C5-BDFEF90D63AE}" type="slidenum">
               <a:rPr lang="en-CA" sz="1200">
                 <a:solidFill>
                   <a:srgbClr val="8b8b8b"/>
@@ -10686,7 +10693,7 @@
         <p:spPr>
           <a:xfrm>
             <a:off x="65880" y="1830960"/>
-            <a:ext cx="4200480" cy="4264200"/>
+            <a:ext cx="4200120" cy="4263840"/>
           </a:xfrm>
           <a:prstGeom prst="rect">
             <a:avLst/>
@@ -11112,7 +11119,7 @@
         <p:spPr>
           <a:xfrm>
             <a:off x="1482120" y="1461600"/>
-            <a:ext cx="1383120" cy="364320"/>
+            <a:ext cx="1382760" cy="363960"/>
           </a:xfrm>
           <a:prstGeom prst="rect">
             <a:avLst/>
@@ -11148,7 +11155,7 @@
         <p:spPr>
           <a:xfrm>
             <a:off x="6014160" y="1461600"/>
-            <a:ext cx="1383120" cy="364320"/>
+            <a:ext cx="1382760" cy="363960"/>
           </a:xfrm>
           <a:prstGeom prst="rect">
             <a:avLst/>
@@ -11214,7 +11221,6 @@
                                           </p:spTgt>
                                         </p:tgtEl>
                                       </p:cBhvr>
-                                      <p:to/>
                                     </p:set>
                                     <p:set>
                                       <p:cBhvr>
@@ -11227,7 +11233,6 @@
                                           </p:spTgt>
                                         </p:tgtEl>
                                       </p:cBhvr>
-                                      <p:to/>
                                     </p:set>
                                     <p:set>
                                       <p:cBhvr>
@@ -11261,7 +11266,6 @@
                                           </p:spTgt>
                                         </p:tgtEl>
                                       </p:cBhvr>
-                                      <p:to/>
                                     </p:set>
                                     <p:set>
                                       <p:cBhvr>
@@ -11274,7 +11278,6 @@
                                           </p:spTgt>
                                         </p:tgtEl>
                                       </p:cBhvr>
-                                      <p:to/>
                                     </p:set>
                                     <p:set>
                                       <p:cBhvr>
@@ -11308,7 +11311,6 @@
                                           </p:spTgt>
                                         </p:tgtEl>
                                       </p:cBhvr>
-                                      <p:to/>
                                     </p:set>
                                     <p:set>
                                       <p:cBhvr>
@@ -11321,7 +11323,6 @@
                                           </p:spTgt>
                                         </p:tgtEl>
                                       </p:cBhvr>
-                                      <p:to/>
                                     </p:set>
                                     <p:set>
                                       <p:cBhvr>
@@ -11355,7 +11356,6 @@
                                           </p:spTgt>
                                         </p:tgtEl>
                                       </p:cBhvr>
-                                      <p:to/>
                                     </p:set>
                                     <p:set>
                                       <p:cBhvr>
@@ -11368,7 +11368,6 @@
                                           </p:spTgt>
                                         </p:tgtEl>
                                       </p:cBhvr>
-                                      <p:to/>
                                     </p:set>
                                     <p:set>
                                       <p:cBhvr>
@@ -11402,7 +11401,6 @@
                                           </p:spTgt>
                                         </p:tgtEl>
                                       </p:cBhvr>
-                                      <p:to/>
                                     </p:set>
                                     <p:set>
                                       <p:cBhvr>
@@ -11415,7 +11413,6 @@
                                           </p:spTgt>
                                         </p:tgtEl>
                                       </p:cBhvr>
-                                      <p:to/>
                                     </p:set>
                                     <p:set>
                                       <p:cBhvr>
@@ -11449,7 +11446,6 @@
                                           </p:spTgt>
                                         </p:tgtEl>
                                       </p:cBhvr>
-                                      <p:to/>
                                     </p:set>
                                     <p:set>
                                       <p:cBhvr>
@@ -11462,7 +11458,6 @@
                                           </p:spTgt>
                                         </p:tgtEl>
                                       </p:cBhvr>
-                                      <p:to/>
                                     </p:set>
                                     <p:set>
                                       <p:cBhvr>
@@ -11496,7 +11491,6 @@
                                           </p:spTgt>
                                         </p:tgtEl>
                                       </p:cBhvr>
-                                      <p:to/>
                                     </p:set>
                                     <p:set>
                                       <p:cBhvr>
@@ -11509,7 +11503,6 @@
                                           </p:spTgt>
                                         </p:tgtEl>
                                       </p:cBhvr>
-                                      <p:to/>
                                     </p:set>
                                     <p:set>
                                       <p:cBhvr>
@@ -11543,7 +11536,6 @@
                                           </p:spTgt>
                                         </p:tgtEl>
                                       </p:cBhvr>
-                                      <p:to/>
                                     </p:set>
                                     <p:set>
                                       <p:cBhvr>
@@ -11556,7 +11548,6 @@
                                           </p:spTgt>
                                         </p:tgtEl>
                                       </p:cBhvr>
-                                      <p:to/>
                                     </p:set>
                                     <p:set>
                                       <p:cBhvr>
@@ -11590,7 +11581,6 @@
                                           </p:spTgt>
                                         </p:tgtEl>
                                       </p:cBhvr>
-                                      <p:to/>
                                     </p:set>
                                     <p:set>
                                       <p:cBhvr>
@@ -11603,7 +11593,6 @@
                                           </p:spTgt>
                                         </p:tgtEl>
                                       </p:cBhvr>
-                                      <p:to/>
                                     </p:set>
                                     <p:set>
                                       <p:cBhvr>
@@ -11637,7 +11626,6 @@
                                           </p:spTgt>
                                         </p:tgtEl>
                                       </p:cBhvr>
-                                      <p:to/>
                                     </p:set>
                                     <p:set>
                                       <p:cBhvr>
@@ -11650,7 +11638,6 @@
                                           </p:spTgt>
                                         </p:tgtEl>
                                       </p:cBhvr>
-                                      <p:to/>
                                     </p:set>
                                     <p:set>
                                       <p:cBhvr>

</xml_diff>